<commit_message>
more clean-up bundle font
</commit_message>
<xml_diff>
--- a/input/images/GFE_Bundle.pptx
+++ b/input/images/GFE_Bundle.pptx
@@ -3776,7 +3776,7 @@
         </p:nvSpPr>
         <p:spPr>
           <a:xfrm>
-            <a:off x="655004" y="170778"/>
+            <a:off x="276644" y="170778"/>
             <a:ext cx="5548889" cy="6570617"/>
           </a:xfrm>
           <a:prstGeom prst="flowChartAlternateProcess">
@@ -3828,7 +3828,7 @@
         </p:nvSpPr>
         <p:spPr>
           <a:xfrm>
-            <a:off x="2535012" y="109044"/>
+            <a:off x="2156652" y="109044"/>
             <a:ext cx="2149014" cy="461665"/>
           </a:xfrm>
           <a:prstGeom prst="rect">
@@ -3863,7 +3863,7 @@
         </p:nvSpPr>
         <p:spPr>
           <a:xfrm>
-            <a:off x="961701" y="493681"/>
+            <a:off x="583341" y="493681"/>
             <a:ext cx="4967392" cy="5830574"/>
           </a:xfrm>
           <a:prstGeom prst="flowChartAlternateProcess">
@@ -3909,7 +3909,7 @@
         </p:nvSpPr>
         <p:spPr>
           <a:xfrm>
-            <a:off x="1820443" y="599816"/>
+            <a:off x="1442083" y="599816"/>
             <a:ext cx="3135906" cy="307777"/>
           </a:xfrm>
           <a:prstGeom prst="rect">
@@ -3949,7 +3949,7 @@
         </p:nvSpPr>
         <p:spPr>
           <a:xfrm>
-            <a:off x="1135363" y="1415806"/>
+            <a:off x="757003" y="1415806"/>
             <a:ext cx="1501553" cy="421278"/>
           </a:xfrm>
           <a:prstGeom prst="flowChartAlternateProcess">
@@ -4003,7 +4003,7 @@
         </p:nvSpPr>
         <p:spPr>
           <a:xfrm>
-            <a:off x="2719996" y="1413617"/>
+            <a:off x="2341636" y="1413617"/>
             <a:ext cx="1477904" cy="421278"/>
           </a:xfrm>
           <a:prstGeom prst="flowChartAlternateProcess">
@@ -4057,7 +4057,7 @@
         </p:nvSpPr>
         <p:spPr>
           <a:xfrm>
-            <a:off x="1136651" y="1870926"/>
+            <a:off x="758291" y="1870926"/>
             <a:ext cx="1501553" cy="421278"/>
           </a:xfrm>
           <a:prstGeom prst="flowChartAlternateProcess">
@@ -4111,7 +4111,7 @@
         </p:nvSpPr>
         <p:spPr>
           <a:xfrm>
-            <a:off x="4272363" y="1389776"/>
+            <a:off x="3894003" y="1389776"/>
             <a:ext cx="1477904" cy="453006"/>
           </a:xfrm>
           <a:prstGeom prst="flowChartAlternateProcess">
@@ -4165,7 +4165,7 @@
         </p:nvSpPr>
         <p:spPr>
           <a:xfrm>
-            <a:off x="2719996" y="1874609"/>
+            <a:off x="2341636" y="1874609"/>
             <a:ext cx="1476834" cy="421279"/>
           </a:xfrm>
           <a:prstGeom prst="flowChartAlternateProcess">
@@ -4219,7 +4219,7 @@
         </p:nvSpPr>
         <p:spPr>
           <a:xfrm>
-            <a:off x="4272363" y="1879305"/>
+            <a:off x="3894003" y="1879305"/>
             <a:ext cx="1476834" cy="431075"/>
           </a:xfrm>
           <a:prstGeom prst="flowChartAlternateProcess">
@@ -4273,7 +4273,7 @@
         </p:nvSpPr>
         <p:spPr>
           <a:xfrm>
-            <a:off x="2719996" y="2331203"/>
+            <a:off x="2341636" y="2331203"/>
             <a:ext cx="1477904" cy="456351"/>
           </a:xfrm>
           <a:prstGeom prst="flowChartAlternateProcess">
@@ -4327,7 +4327,7 @@
         </p:nvSpPr>
         <p:spPr>
           <a:xfrm>
-            <a:off x="1135363" y="2830110"/>
+            <a:off x="757003" y="2830110"/>
             <a:ext cx="2266594" cy="3336699"/>
           </a:xfrm>
           <a:prstGeom prst="flowChartAlternateProcess">
@@ -4473,7 +4473,7 @@
         </p:nvSpPr>
         <p:spPr>
           <a:xfrm>
-            <a:off x="3500429" y="2830110"/>
+            <a:off x="3122069" y="2830110"/>
             <a:ext cx="2221102" cy="3315425"/>
           </a:xfrm>
           <a:prstGeom prst="flowChartAlternateProcess">
@@ -4507,16 +4507,12 @@
           <a:lstStyle/>
           <a:p>
             <a:r>
-              <a:rPr lang="en-US" sz="900" dirty="0">
-                <a:latin typeface="Avenir Book" panose="02000503020000020003" pitchFamily="2" charset="0"/>
-              </a:rPr>
+              <a:rPr lang="en-US" sz="1000" dirty="0"/>
               <a:t>Slices for:</a:t>
             </a:r>
           </a:p>
           <a:p>
-            <a:endParaRPr lang="en-US" sz="900" dirty="0">
-              <a:latin typeface="Avenir Book" panose="02000503020000020003" pitchFamily="2" charset="0"/>
-            </a:endParaRPr>
+            <a:endParaRPr lang="en-US" sz="1000" dirty="0"/>
           </a:p>
           <a:p>
             <a:pPr marL="171450" indent="-171450">
@@ -4524,9 +4520,7 @@
               <a:buChar char="•"/>
             </a:pPr>
             <a:r>
-              <a:rPr lang="en-US" sz="900" dirty="0">
-                <a:latin typeface="Avenir Book" panose="02000503020000020003" pitchFamily="2" charset="0"/>
-              </a:rPr>
+              <a:rPr lang="en-US" sz="1000" dirty="0"/>
               <a:t>The element Claim.careTeam is sliced based on the value of pattern:role</a:t>
             </a:r>
           </a:p>
@@ -4535,9 +4529,10 @@
               <a:buFont typeface="Arial" panose="020B0604020202020204" pitchFamily="34" charset="0"/>
               <a:buChar char="•"/>
             </a:pPr>
-            <a:endParaRPr lang="en-US" sz="900" dirty="0">
-              <a:latin typeface="Avenir Book" panose="02000503020000020003" pitchFamily="2" charset="0"/>
-            </a:endParaRPr>
+            <a:r>
+              <a:rPr lang="en-US" sz="1000" dirty="0"/>
+              <a:t>The element Claim.supportingInfo is sliced based on the value of pattern:category</a:t>
+            </a:r>
           </a:p>
           <a:p>
             <a:pPr marL="171450" indent="-171450">
@@ -4545,10 +4540,8 @@
               <a:buChar char="•"/>
             </a:pPr>
             <a:r>
-              <a:rPr lang="en-US" sz="900" dirty="0">
-                <a:latin typeface="Avenir Book" panose="02000503020000020003" pitchFamily="2" charset="0"/>
-              </a:rPr>
-              <a:t>The element Claim.supportingInfo is sliced based on the value of pattern:category</a:t>
+              <a:rPr lang="en-US" sz="1000" dirty="0"/>
+              <a:t>The element Claim.diagnosis is sliced based on the value of pattern:type</a:t>
             </a:r>
           </a:p>
           <a:p>
@@ -4556,9 +4549,10 @@
               <a:buFont typeface="Arial" panose="020B0604020202020204" pitchFamily="34" charset="0"/>
               <a:buChar char="•"/>
             </a:pPr>
-            <a:endParaRPr lang="en-US" sz="900" dirty="0">
-              <a:latin typeface="Avenir Book" panose="02000503020000020003" pitchFamily="2" charset="0"/>
-            </a:endParaRPr>
+            <a:r>
+              <a:rPr lang="en-US" sz="1000" dirty="0"/>
+              <a:t>The element Claim.procedure is sliced based on the value of pattern:type</a:t>
+            </a:r>
           </a:p>
           <a:p>
             <a:pPr marL="171450" indent="-171450">
@@ -4566,51 +4560,7 @@
               <a:buChar char="•"/>
             </a:pPr>
             <a:r>
-              <a:rPr lang="en-US" sz="900" dirty="0">
-                <a:latin typeface="Avenir Book" panose="02000503020000020003" pitchFamily="2" charset="0"/>
-              </a:rPr>
-              <a:t>The element Claim.diagnosis is sliced based on the value of pattern:type</a:t>
-            </a:r>
-          </a:p>
-          <a:p>
-            <a:pPr marL="171450" indent="-171450">
-              <a:buFont typeface="Arial" panose="020B0604020202020204" pitchFamily="34" charset="0"/>
-              <a:buChar char="•"/>
-            </a:pPr>
-            <a:endParaRPr lang="en-US" sz="900" dirty="0">
-              <a:latin typeface="Avenir Book" panose="02000503020000020003" pitchFamily="2" charset="0"/>
-            </a:endParaRPr>
-          </a:p>
-          <a:p>
-            <a:pPr marL="171450" indent="-171450">
-              <a:buFont typeface="Arial" panose="020B0604020202020204" pitchFamily="34" charset="0"/>
-              <a:buChar char="•"/>
-            </a:pPr>
-            <a:r>
-              <a:rPr lang="en-US" sz="900" dirty="0">
-                <a:latin typeface="Avenir Book" panose="02000503020000020003" pitchFamily="2" charset="0"/>
-              </a:rPr>
-              <a:t>The element Claim.procedure is sliced based on the value of pattern:type</a:t>
-            </a:r>
-          </a:p>
-          <a:p>
-            <a:pPr marL="171450" indent="-171450">
-              <a:buFont typeface="Arial" panose="020B0604020202020204" pitchFamily="34" charset="0"/>
-              <a:buChar char="•"/>
-            </a:pPr>
-            <a:endParaRPr lang="en-US" sz="900" dirty="0">
-              <a:latin typeface="Avenir Book" panose="02000503020000020003" pitchFamily="2" charset="0"/>
-            </a:endParaRPr>
-          </a:p>
-          <a:p>
-            <a:pPr marL="171450" indent="-171450">
-              <a:buFont typeface="Arial" panose="020B0604020202020204" pitchFamily="34" charset="0"/>
-              <a:buChar char="•"/>
-            </a:pPr>
-            <a:r>
-              <a:rPr lang="en-US" sz="900" dirty="0">
-                <a:latin typeface="Avenir Book" panose="02000503020000020003" pitchFamily="2" charset="0"/>
-              </a:rPr>
+              <a:rPr lang="en-US" sz="1000" dirty="0"/>
               <a:t>The element Claim.item.location[x] is sliced based on the value of type:$this</a:t>
             </a:r>
           </a:p>
@@ -4630,7 +4580,7 @@
         </p:nvSpPr>
         <p:spPr>
           <a:xfrm>
-            <a:off x="2277845" y="850835"/>
+            <a:off x="1899485" y="850835"/>
             <a:ext cx="2221102" cy="523220"/>
           </a:xfrm>
           <a:prstGeom prst="rect">
@@ -4674,7 +4624,7 @@
         </p:nvSpPr>
         <p:spPr>
           <a:xfrm>
-            <a:off x="2784444" y="6371832"/>
+            <a:off x="2406084" y="6371832"/>
             <a:ext cx="1321906" cy="276999"/>
           </a:xfrm>
           <a:prstGeom prst="rect">
@@ -4709,7 +4659,7 @@
         </p:nvSpPr>
         <p:spPr>
           <a:xfrm>
-            <a:off x="6395146" y="143691"/>
+            <a:off x="6016786" y="143691"/>
             <a:ext cx="5548889" cy="6570617"/>
           </a:xfrm>
           <a:prstGeom prst="flowChartAlternateProcess">
@@ -4761,7 +4711,7 @@
         </p:nvSpPr>
         <p:spPr>
           <a:xfrm>
-            <a:off x="6701843" y="472407"/>
+            <a:off x="6323483" y="472407"/>
             <a:ext cx="4967392" cy="5830574"/>
           </a:xfrm>
           <a:prstGeom prst="flowChartAlternateProcess">
@@ -4807,7 +4757,7 @@
         </p:nvSpPr>
         <p:spPr>
           <a:xfrm>
-            <a:off x="7531685" y="568800"/>
+            <a:off x="7153325" y="568800"/>
             <a:ext cx="3193705" cy="307777"/>
           </a:xfrm>
           <a:prstGeom prst="rect">
@@ -4847,7 +4797,7 @@
         </p:nvSpPr>
         <p:spPr>
           <a:xfrm>
-            <a:off x="6875505" y="1394532"/>
+            <a:off x="6497145" y="1394532"/>
             <a:ext cx="1501553" cy="421278"/>
           </a:xfrm>
           <a:prstGeom prst="flowChartAlternateProcess">
@@ -4901,7 +4851,7 @@
         </p:nvSpPr>
         <p:spPr>
           <a:xfrm>
-            <a:off x="8460138" y="1392343"/>
+            <a:off x="8081778" y="1392343"/>
             <a:ext cx="1477904" cy="421278"/>
           </a:xfrm>
           <a:prstGeom prst="flowChartAlternateProcess">
@@ -4955,7 +4905,7 @@
         </p:nvSpPr>
         <p:spPr>
           <a:xfrm>
-            <a:off x="10012505" y="1368502"/>
+            <a:off x="9634145" y="1368502"/>
             <a:ext cx="1477904" cy="453006"/>
           </a:xfrm>
           <a:prstGeom prst="flowChartAlternateProcess">
@@ -5009,7 +4959,7 @@
         </p:nvSpPr>
         <p:spPr>
           <a:xfrm>
-            <a:off x="8459068" y="1853335"/>
+            <a:off x="8080708" y="1853335"/>
             <a:ext cx="1477904" cy="456351"/>
           </a:xfrm>
           <a:prstGeom prst="flowChartAlternateProcess">
@@ -5063,7 +5013,7 @@
         </p:nvSpPr>
         <p:spPr>
           <a:xfrm>
-            <a:off x="10012505" y="1858031"/>
+            <a:off x="9634145" y="1858031"/>
             <a:ext cx="1476834" cy="431075"/>
           </a:xfrm>
           <a:prstGeom prst="flowChartAlternateProcess">
@@ -5117,7 +5067,7 @@
         </p:nvSpPr>
         <p:spPr>
           <a:xfrm>
-            <a:off x="6892999" y="1854029"/>
+            <a:off x="6514639" y="1854029"/>
             <a:ext cx="1477904" cy="456351"/>
           </a:xfrm>
           <a:prstGeom prst="flowChartAlternateProcess">
@@ -5171,7 +5121,7 @@
         </p:nvSpPr>
         <p:spPr>
           <a:xfrm>
-            <a:off x="6875504" y="2808836"/>
+            <a:off x="6497144" y="2808836"/>
             <a:ext cx="2320747" cy="3336699"/>
           </a:xfrm>
           <a:prstGeom prst="flowChartAlternateProcess">
@@ -5317,7 +5267,7 @@
         </p:nvSpPr>
         <p:spPr>
           <a:xfrm>
-            <a:off x="9313817" y="2808836"/>
+            <a:off x="8935457" y="2808836"/>
             <a:ext cx="2147856" cy="3336699"/>
           </a:xfrm>
           <a:prstGeom prst="flowChartAlternateProcess">
@@ -5435,7 +5385,7 @@
         </p:nvSpPr>
         <p:spPr>
           <a:xfrm>
-            <a:off x="8017987" y="829561"/>
+            <a:off x="7639627" y="829561"/>
             <a:ext cx="2221102" cy="523220"/>
           </a:xfrm>
           <a:prstGeom prst="rect">
@@ -5479,7 +5429,7 @@
         </p:nvSpPr>
         <p:spPr>
           <a:xfrm>
-            <a:off x="8524586" y="6350558"/>
+            <a:off x="8146226" y="6350558"/>
             <a:ext cx="1321906" cy="276999"/>
           </a:xfrm>
           <a:prstGeom prst="rect">

</xml_diff>

<commit_message>
Updated GFE_Bundle.jpg to show both institutional and professional GFEs in the bundle.
</commit_message>
<xml_diff>
--- a/input/images/GFE_Bundle.pptx
+++ b/input/images/GFE_Bundle.pptx
@@ -6706,6 +6706,23 @@
                     <a:latin typeface="Arial" panose="020B0604020202020204"/>
                     <a:ea typeface="+mn-ea"/>
                     <a:cs typeface="+mn-cs"/>
+                  </a:rPr>
+                </a:br>
+                <a:r>
+                  <a:rPr lang="en-US" sz="1050" b="1" kern="0" dirty="0">
+                    <a:solidFill>
+                      <a:prstClr val="white"/>
+                    </a:solidFill>
+                    <a:latin typeface="Arial" panose="020B0604020202020204"/>
+                  </a:rPr>
+                  <a:t>Institutional or Professional</a:t>
+                </a:r>
+                <a:br>
+                  <a:rPr lang="en-US" sz="1050" b="1" kern="0" dirty="0">
+                    <a:solidFill>
+                      <a:prstClr val="white"/>
+                    </a:solidFill>
+                    <a:latin typeface="Arial" panose="020B0604020202020204"/>
                   </a:rPr>
                 </a:br>
                 <a:r>

</xml_diff>